<commit_message>
Added a new module for shape detection, instead of getting the features from the full image, we extract the features from the image that contains the edges in the image
</commit_message>
<xml_diff>
--- a/Presentation1.pptx
+++ b/Presentation1.pptx
@@ -2740,7 +2740,7 @@
         <a:p>
           <a:r>
             <a:rPr lang="en-US" dirty="0" smtClean="0"/>
-            <a:t>1</a:t>
+            <a:t>No. of classes of images</a:t>
           </a:r>
           <a:endParaRPr lang="en-US" dirty="0"/>
         </a:p>
@@ -2777,7 +2777,7 @@
         <a:p>
           <a:r>
             <a:rPr lang="en-US" dirty="0" smtClean="0"/>
-            <a:t>No. of classes of images</a:t>
+            <a:t>1</a:t>
           </a:r>
           <a:endParaRPr lang="en-US" dirty="0"/>
         </a:p>
@@ -3430,7 +3430,7 @@
           </a:pPr>
           <a:r>
             <a:rPr lang="en-US" sz="3000" kern="1200" dirty="0" smtClean="0"/>
-            <a:t>1</a:t>
+            <a:t>No. of classes of images</a:t>
           </a:r>
           <a:endParaRPr lang="en-US" sz="3000" kern="1200" dirty="0"/>
         </a:p>
@@ -3573,7 +3573,7 @@
           </a:pPr>
           <a:r>
             <a:rPr lang="en-US" sz="3000" kern="1200" dirty="0" smtClean="0"/>
-            <a:t>No. of classes of images</a:t>
+            <a:t>1</a:t>
           </a:r>
           <a:endParaRPr lang="en-US" sz="3000" kern="1200" dirty="0"/>
         </a:p>
@@ -7237,7 +7237,7 @@
             <a:fld id="{6F64CFDD-B40B-4247-9307-EA47CA882A58}" type="datetimeFigureOut">
               <a:rPr lang="en-US" smtClean="0"/>
               <a:pPr/>
-              <a:t>18-Jun-14</a:t>
+              <a:t>19-Jun-14</a:t>
             </a:fld>
             <a:endParaRPr lang="en-US"/>
           </a:p>
@@ -16263,8 +16263,21 @@
             </a:r>
             <a:r>
               <a:rPr lang="en-US" dirty="0" smtClean="0"/>
-              <a:t> matrix: This is a row vector that // TO DO</a:t>
-            </a:r>
+              <a:t> matrix: This is a row vector that </a:t>
+            </a:r>
+            <a:r>
+              <a:rPr lang="en-US" dirty="0" smtClean="0"/>
+              <a:t>consists </a:t>
+            </a:r>
+            <a:r>
+              <a:rPr lang="en-US" smtClean="0"/>
+              <a:t>of coefficients </a:t>
+            </a:r>
+            <a:r>
+              <a:rPr lang="en-US" dirty="0" smtClean="0"/>
+              <a:t>ranging from 0 to 1.</a:t>
+            </a:r>
+            <a:endParaRPr lang="en-US" dirty="0" smtClean="0"/>
           </a:p>
         </p:txBody>
       </p:sp>
@@ -16979,7 +16992,7 @@
         <p:spPr/>
         <p:txBody>
           <a:bodyPr>
-            <a:normAutofit/>
+            <a:normAutofit fontScale="85000" lnSpcReduction="10000"/>
           </a:bodyPr>
           <a:lstStyle/>
           <a:p>
@@ -17006,7 +17019,19 @@
           <a:p>
             <a:r>
               <a:rPr lang="en-US" dirty="0" smtClean="0"/>
-              <a:t>The output matrix is // TO DO</a:t>
+              <a:t>The output matrix is </a:t>
+            </a:r>
+            <a:r>
+              <a:rPr lang="en-US" dirty="0" smtClean="0"/>
+              <a:t>a row vector that consists of coefficients in the range 0 to 1, such that the closer a </a:t>
+            </a:r>
+            <a:r>
+              <a:rPr lang="en-US" dirty="0" err="1" smtClean="0"/>
+              <a:t>coeffecient</a:t>
+            </a:r>
+            <a:r>
+              <a:rPr lang="en-US" dirty="0" smtClean="0"/>
+              <a:t> is to 1, the higher is the probability of the input feature set being a part of that class.</a:t>
             </a:r>
             <a:endParaRPr lang="en-US" dirty="0"/>
           </a:p>
@@ -17019,7 +17044,7 @@
           <p:nvPr/>
         </p:nvGraphicFramePr>
         <p:xfrm>
-          <a:off x="1524000" y="2438400"/>
+          <a:off x="1524000" y="1981200"/>
           <a:ext cx="6096000" cy="2286000"/>
         </p:xfrm>
         <a:graphic>
@@ -17962,15 +17987,15 @@
           </p:spPr>
           <p:style>
             <a:lnRef idx="2">
-              <a:schemeClr val="accent1">
+              <a:schemeClr val="accent3">
                 <a:shade val="50000"/>
               </a:schemeClr>
             </a:lnRef>
             <a:fillRef idx="1">
-              <a:schemeClr val="accent1"/>
+              <a:schemeClr val="accent3"/>
             </a:fillRef>
             <a:effectRef idx="0">
-              <a:schemeClr val="accent1"/>
+              <a:schemeClr val="accent3"/>
             </a:effectRef>
             <a:fontRef idx="minor">
               <a:schemeClr val="lt1"/>
@@ -18239,6 +18264,36 @@
           </a:p>
         </p:txBody>
       </p:sp>
+      <p:sp>
+        <p:nvSpPr>
+          <p:cNvPr id="18" name="TextBox 17"/>
+          <p:cNvSpPr txBox="1"/>
+          <p:nvPr/>
+        </p:nvSpPr>
+        <p:spPr>
+          <a:xfrm>
+            <a:off x="7162800" y="838200"/>
+            <a:ext cx="1111394" cy="461665"/>
+          </a:xfrm>
+          <a:prstGeom prst="rect">
+            <a:avLst/>
+          </a:prstGeom>
+          <a:noFill/>
+        </p:spPr>
+        <p:txBody>
+          <a:bodyPr wrap="none" rtlCol="0">
+            <a:spAutoFit/>
+          </a:bodyPr>
+          <a:lstStyle/>
+          <a:p>
+            <a:r>
+              <a:rPr lang="en-US" sz="2400" dirty="0" smtClean="0"/>
+              <a:t>Solved!</a:t>
+            </a:r>
+            <a:endParaRPr lang="en-US" sz="2400" dirty="0"/>
+          </a:p>
+        </p:txBody>
+      </p:sp>
     </p:spTree>
   </p:cSld>
   <p:clrMapOvr>
@@ -18890,7 +18945,11 @@
           <a:p>
             <a:r>
               <a:rPr lang="en-US" dirty="0" smtClean="0"/>
-              <a:t>2. Obstruction: Proposed Solution</a:t>
+              <a:t>2. Obstruction: </a:t>
+            </a:r>
+            <a:r>
+              <a:rPr lang="en-US" dirty="0" smtClean="0"/>
+              <a:t>Solution</a:t>
             </a:r>
             <a:endParaRPr lang="en-US" dirty="0"/>
           </a:p>
@@ -18916,12 +18975,12 @@
               <a:t>Instead of trying to find what is there behind the line, we train the neural network to </a:t>
             </a:r>
             <a:r>
-              <a:rPr lang="en-US" dirty="0" err="1" smtClean="0"/>
-              <a:t>recognise</a:t>
-            </a:r>
-            <a:r>
               <a:rPr lang="en-US" dirty="0" smtClean="0"/>
-              <a:t> the features on the two sides of the line.</a:t>
+              <a:t>recognize </a:t>
+            </a:r>
+            <a:r>
+              <a:rPr lang="en-US" dirty="0" smtClean="0"/>
+              <a:t>the features on the two sides of the line.</a:t>
             </a:r>
           </a:p>
           <a:p>
@@ -21137,16 +21196,7 @@
                 </a:solidFill>
                 <a:latin typeface="Calibri" pitchFamily="34" charset="0"/>
               </a:rPr>
-              <a:t>non-linear </a:t>
-            </a:r>
-            <a:r>
-              <a:rPr lang="en-US" sz="2800" dirty="0" smtClean="0">
-                <a:solidFill>
-                  <a:srgbClr val="000000"/>
-                </a:solidFill>
-                <a:latin typeface="Calibri" pitchFamily="34" charset="0"/>
-              </a:rPr>
-              <a:t>Lucy-Richardson </a:t>
+              <a:t>non-linear Lucy-Richardson </a:t>
             </a:r>
             <a:r>
               <a:rPr lang="en-US" sz="2800" dirty="0">

</xml_diff>